<commit_message>
somehow main was deleted - this is the restoration
</commit_message>
<xml_diff>
--- a/hw_1_images.pptx
+++ b/hw_1_images.pptx
@@ -9,6 +9,12 @@
     <p:sldId id="259" r:id="rId3"/>
     <p:sldId id="258" r:id="rId4"/>
     <p:sldId id="257" r:id="rId5"/>
+    <p:sldId id="261" r:id="rId6"/>
+    <p:sldId id="260" r:id="rId7"/>
+    <p:sldId id="262" r:id="rId8"/>
+    <p:sldId id="263" r:id="rId9"/>
+    <p:sldId id="265" r:id="rId10"/>
+    <p:sldId id="266" r:id="rId11"/>
   </p:sldIdLst>
   <p:sldSz cx="12192000" cy="6858000"/>
   <p:notesSz cx="6858000" cy="9144000"/>
@@ -107,6 +113,11 @@
       </a:defRPr>
     </a:lvl9pPr>
   </p:defaultTextStyle>
+  <p:extLst>
+    <p:ext uri="{EFAFB233-063F-42B5-8137-9DF3F51BA10A}">
+      <p15:sldGuideLst xmlns:p15="http://schemas.microsoft.com/office/powerpoint/2012/main"/>
+    </p:ext>
+  </p:extLst>
 </p:presentation>
 </file>
 
@@ -4718,6 +4729,102 @@
 </p:sld>
 </file>
 
+<file path=ppt/slides/slide10.xml><?xml version="1.0" encoding="utf-8"?>
+<p:sld xmlns:a="http://schemas.openxmlformats.org/drawingml/2006/main" xmlns:r="http://schemas.openxmlformats.org/officeDocument/2006/relationships" xmlns:p="http://schemas.openxmlformats.org/presentationml/2006/main">
+  <p:cSld>
+    <p:spTree>
+      <p:nvGrpSpPr>
+        <p:cNvPr id="1" name=""/>
+        <p:cNvGrpSpPr/>
+        <p:nvPr/>
+      </p:nvGrpSpPr>
+      <p:grpSpPr>
+        <a:xfrm>
+          <a:off x="0" y="0"/>
+          <a:ext cx="0" cy="0"/>
+          <a:chOff x="0" y="0"/>
+          <a:chExt cx="0" cy="0"/>
+        </a:xfrm>
+      </p:grpSpPr>
+      <p:pic>
+        <p:nvPicPr>
+          <p:cNvPr id="5" name="Picture 4">
+            <a:extLst>
+              <a:ext uri="{FF2B5EF4-FFF2-40B4-BE49-F238E27FC236}">
+                <a16:creationId xmlns:a16="http://schemas.microsoft.com/office/drawing/2014/main" id="{8ACD0F1D-337E-EE57-72D7-7026B2A2773E}"/>
+              </a:ext>
+            </a:extLst>
+          </p:cNvPr>
+          <p:cNvPicPr>
+            <a:picLocks noChangeAspect="1"/>
+          </p:cNvPicPr>
+          <p:nvPr/>
+        </p:nvPicPr>
+        <p:blipFill>
+          <a:blip r:embed="rId2"/>
+          <a:stretch>
+            <a:fillRect/>
+          </a:stretch>
+        </p:blipFill>
+        <p:spPr>
+          <a:xfrm>
+            <a:off x="2286000" y="1524000"/>
+            <a:ext cx="7620000" cy="3810000"/>
+          </a:xfrm>
+          <a:prstGeom prst="rect">
+            <a:avLst/>
+          </a:prstGeom>
+        </p:spPr>
+      </p:pic>
+      <p:sp>
+        <p:nvSpPr>
+          <p:cNvPr id="6" name="TextBox 5">
+            <a:extLst>
+              <a:ext uri="{FF2B5EF4-FFF2-40B4-BE49-F238E27FC236}">
+                <a16:creationId xmlns:a16="http://schemas.microsoft.com/office/drawing/2014/main" id="{380B0CAF-281B-B651-A05C-9EF1E6C6B8FC}"/>
+              </a:ext>
+            </a:extLst>
+          </p:cNvPr>
+          <p:cNvSpPr txBox="1"/>
+          <p:nvPr/>
+        </p:nvSpPr>
+        <p:spPr>
+          <a:xfrm>
+            <a:off x="1892808" y="566928"/>
+            <a:ext cx="437940" cy="369332"/>
+          </a:xfrm>
+          <a:prstGeom prst="rect">
+            <a:avLst/>
+          </a:prstGeom>
+          <a:noFill/>
+        </p:spPr>
+        <p:txBody>
+          <a:bodyPr wrap="none" rtlCol="0">
+            <a:spAutoFit/>
+          </a:bodyPr>
+          <a:lstStyle/>
+          <a:p>
+            <a:r>
+              <a:rPr lang="en-US" dirty="0"/>
+              <a:t>q2</a:t>
+            </a:r>
+            <a:endParaRPr lang="en-IL" dirty="0"/>
+          </a:p>
+        </p:txBody>
+      </p:sp>
+    </p:spTree>
+    <p:extLst>
+      <p:ext uri="{BB962C8B-B14F-4D97-AF65-F5344CB8AC3E}">
+        <p14:creationId xmlns:p14="http://schemas.microsoft.com/office/powerpoint/2010/main" val="2468771659"/>
+      </p:ext>
+    </p:extLst>
+  </p:cSld>
+  <p:clrMapOvr>
+    <a:masterClrMapping/>
+  </p:clrMapOvr>
+</p:sld>
+</file>
+
 <file path=ppt/slides/slide2.xml><?xml version="1.0" encoding="utf-8"?>
 <p:sld xmlns:a="http://schemas.openxmlformats.org/drawingml/2006/main" xmlns:r="http://schemas.openxmlformats.org/officeDocument/2006/relationships" xmlns:p="http://schemas.openxmlformats.org/presentationml/2006/main">
   <p:cSld>
@@ -4770,6 +4877,42 @@
           </a:xfrm>
         </p:spPr>
       </p:pic>
+      <p:sp>
+        <p:nvSpPr>
+          <p:cNvPr id="2" name="TextBox 1">
+            <a:extLst>
+              <a:ext uri="{FF2B5EF4-FFF2-40B4-BE49-F238E27FC236}">
+                <a16:creationId xmlns:a16="http://schemas.microsoft.com/office/drawing/2014/main" id="{843A37E2-0C72-5E5B-0B7A-0E065B1B3451}"/>
+              </a:ext>
+            </a:extLst>
+          </p:cNvPr>
+          <p:cNvSpPr txBox="1"/>
+          <p:nvPr/>
+        </p:nvSpPr>
+        <p:spPr>
+          <a:xfrm>
+            <a:off x="1892808" y="566928"/>
+            <a:ext cx="437940" cy="369332"/>
+          </a:xfrm>
+          <a:prstGeom prst="rect">
+            <a:avLst/>
+          </a:prstGeom>
+          <a:noFill/>
+        </p:spPr>
+        <p:txBody>
+          <a:bodyPr wrap="none" rtlCol="0">
+            <a:spAutoFit/>
+          </a:bodyPr>
+          <a:lstStyle/>
+          <a:p>
+            <a:r>
+              <a:rPr lang="en-US" dirty="0"/>
+              <a:t>q1</a:t>
+            </a:r>
+            <a:endParaRPr lang="en-IL" dirty="0"/>
+          </a:p>
+        </p:txBody>
+      </p:sp>
     </p:spTree>
     <p:extLst>
       <p:ext uri="{BB962C8B-B14F-4D97-AF65-F5344CB8AC3E}">
@@ -4835,6 +4978,42 @@
           </a:xfrm>
         </p:spPr>
       </p:pic>
+      <p:sp>
+        <p:nvSpPr>
+          <p:cNvPr id="2" name="TextBox 1">
+            <a:extLst>
+              <a:ext uri="{FF2B5EF4-FFF2-40B4-BE49-F238E27FC236}">
+                <a16:creationId xmlns:a16="http://schemas.microsoft.com/office/drawing/2014/main" id="{8F3278A9-6FF1-F9E9-AADF-EFCF05084FB8}"/>
+              </a:ext>
+            </a:extLst>
+          </p:cNvPr>
+          <p:cNvSpPr txBox="1"/>
+          <p:nvPr/>
+        </p:nvSpPr>
+        <p:spPr>
+          <a:xfrm>
+            <a:off x="1892808" y="566928"/>
+            <a:ext cx="437940" cy="369332"/>
+          </a:xfrm>
+          <a:prstGeom prst="rect">
+            <a:avLst/>
+          </a:prstGeom>
+          <a:noFill/>
+        </p:spPr>
+        <p:txBody>
+          <a:bodyPr wrap="none" rtlCol="0">
+            <a:spAutoFit/>
+          </a:bodyPr>
+          <a:lstStyle/>
+          <a:p>
+            <a:r>
+              <a:rPr lang="en-US" dirty="0"/>
+              <a:t>q1</a:t>
+            </a:r>
+            <a:endParaRPr lang="en-IL" dirty="0"/>
+          </a:p>
+        </p:txBody>
+      </p:sp>
     </p:spTree>
     <p:extLst>
       <p:ext uri="{BB962C8B-B14F-4D97-AF65-F5344CB8AC3E}">
@@ -4973,10 +5152,538 @@
           </a:prstGeom>
         </p:spPr>
       </p:pic>
+      <p:sp>
+        <p:nvSpPr>
+          <p:cNvPr id="2" name="TextBox 1">
+            <a:extLst>
+              <a:ext uri="{FF2B5EF4-FFF2-40B4-BE49-F238E27FC236}">
+                <a16:creationId xmlns:a16="http://schemas.microsoft.com/office/drawing/2014/main" id="{2040FBB2-E79C-3C12-AB89-14DFE8F0C6CE}"/>
+              </a:ext>
+            </a:extLst>
+          </p:cNvPr>
+          <p:cNvSpPr txBox="1"/>
+          <p:nvPr/>
+        </p:nvSpPr>
+        <p:spPr>
+          <a:xfrm>
+            <a:off x="1892808" y="566928"/>
+            <a:ext cx="437940" cy="369332"/>
+          </a:xfrm>
+          <a:prstGeom prst="rect">
+            <a:avLst/>
+          </a:prstGeom>
+          <a:noFill/>
+        </p:spPr>
+        <p:txBody>
+          <a:bodyPr wrap="none" rtlCol="0">
+            <a:spAutoFit/>
+          </a:bodyPr>
+          <a:lstStyle/>
+          <a:p>
+            <a:r>
+              <a:rPr lang="en-US" dirty="0"/>
+              <a:t>q1</a:t>
+            </a:r>
+            <a:endParaRPr lang="en-IL" dirty="0"/>
+          </a:p>
+        </p:txBody>
+      </p:sp>
     </p:spTree>
     <p:extLst>
       <p:ext uri="{BB962C8B-B14F-4D97-AF65-F5344CB8AC3E}">
         <p14:creationId xmlns:p14="http://schemas.microsoft.com/office/powerpoint/2010/main" val="2242172314"/>
+      </p:ext>
+    </p:extLst>
+  </p:cSld>
+  <p:clrMapOvr>
+    <a:masterClrMapping/>
+  </p:clrMapOvr>
+</p:sld>
+</file>
+
+<file path=ppt/slides/slide5.xml><?xml version="1.0" encoding="utf-8"?>
+<p:sld xmlns:a="http://schemas.openxmlformats.org/drawingml/2006/main" xmlns:r="http://schemas.openxmlformats.org/officeDocument/2006/relationships" xmlns:p="http://schemas.openxmlformats.org/presentationml/2006/main">
+  <p:cSld>
+    <p:spTree>
+      <p:nvGrpSpPr>
+        <p:cNvPr id="1" name=""/>
+        <p:cNvGrpSpPr/>
+        <p:nvPr/>
+      </p:nvGrpSpPr>
+      <p:grpSpPr>
+        <a:xfrm>
+          <a:off x="0" y="0"/>
+          <a:ext cx="0" cy="0"/>
+          <a:chOff x="0" y="0"/>
+          <a:chExt cx="0" cy="0"/>
+        </a:xfrm>
+      </p:grpSpPr>
+      <p:sp>
+        <p:nvSpPr>
+          <p:cNvPr id="4" name="TextBox 3">
+            <a:extLst>
+              <a:ext uri="{FF2B5EF4-FFF2-40B4-BE49-F238E27FC236}">
+                <a16:creationId xmlns:a16="http://schemas.microsoft.com/office/drawing/2014/main" id="{BBFCB2BD-192A-BA34-20DE-770542860CDA}"/>
+              </a:ext>
+            </a:extLst>
+          </p:cNvPr>
+          <p:cNvSpPr txBox="1"/>
+          <p:nvPr/>
+        </p:nvSpPr>
+        <p:spPr>
+          <a:xfrm>
+            <a:off x="1892808" y="566928"/>
+            <a:ext cx="437940" cy="369332"/>
+          </a:xfrm>
+          <a:prstGeom prst="rect">
+            <a:avLst/>
+          </a:prstGeom>
+          <a:noFill/>
+        </p:spPr>
+        <p:txBody>
+          <a:bodyPr wrap="none" rtlCol="0">
+            <a:spAutoFit/>
+          </a:bodyPr>
+          <a:lstStyle/>
+          <a:p>
+            <a:r>
+              <a:rPr lang="en-US" dirty="0"/>
+              <a:t>q2</a:t>
+            </a:r>
+            <a:endParaRPr lang="en-IL" dirty="0"/>
+          </a:p>
+        </p:txBody>
+      </p:sp>
+      <p:pic>
+        <p:nvPicPr>
+          <p:cNvPr id="6" name="Picture 5" descr="A graph of a train vs. validation loss&#10;&#10;AI-generated content may be incorrect.">
+            <a:extLst>
+              <a:ext uri="{FF2B5EF4-FFF2-40B4-BE49-F238E27FC236}">
+                <a16:creationId xmlns:a16="http://schemas.microsoft.com/office/drawing/2014/main" id="{5E9FEA45-576A-A5AB-EB71-11B3D68A38E0}"/>
+              </a:ext>
+            </a:extLst>
+          </p:cNvPr>
+          <p:cNvPicPr>
+            <a:picLocks noChangeAspect="1"/>
+          </p:cNvPicPr>
+          <p:nvPr/>
+        </p:nvPicPr>
+        <p:blipFill>
+          <a:blip r:embed="rId2">
+            <a:extLst>
+              <a:ext uri="{28A0092B-C50C-407E-A947-70E740481C1C}">
+                <a14:useLocalDpi xmlns:a14="http://schemas.microsoft.com/office/drawing/2010/main" val="0"/>
+              </a:ext>
+            </a:extLst>
+          </a:blip>
+          <a:stretch>
+            <a:fillRect/>
+          </a:stretch>
+        </p:blipFill>
+        <p:spPr>
+          <a:xfrm>
+            <a:off x="3048000" y="1143000"/>
+            <a:ext cx="6096000" cy="4572000"/>
+          </a:xfrm>
+          <a:prstGeom prst="rect">
+            <a:avLst/>
+          </a:prstGeom>
+        </p:spPr>
+      </p:pic>
+    </p:spTree>
+    <p:extLst>
+      <p:ext uri="{BB962C8B-B14F-4D97-AF65-F5344CB8AC3E}">
+        <p14:creationId xmlns:p14="http://schemas.microsoft.com/office/powerpoint/2010/main" val="3130758607"/>
+      </p:ext>
+    </p:extLst>
+  </p:cSld>
+  <p:clrMapOvr>
+    <a:masterClrMapping/>
+  </p:clrMapOvr>
+</p:sld>
+</file>
+
+<file path=ppt/slides/slide6.xml><?xml version="1.0" encoding="utf-8"?>
+<p:sld xmlns:a="http://schemas.openxmlformats.org/drawingml/2006/main" xmlns:r="http://schemas.openxmlformats.org/officeDocument/2006/relationships" xmlns:p="http://schemas.openxmlformats.org/presentationml/2006/main">
+  <p:cSld>
+    <p:spTree>
+      <p:nvGrpSpPr>
+        <p:cNvPr id="1" name=""/>
+        <p:cNvGrpSpPr/>
+        <p:nvPr/>
+      </p:nvGrpSpPr>
+      <p:grpSpPr>
+        <a:xfrm>
+          <a:off x="0" y="0"/>
+          <a:ext cx="0" cy="0"/>
+          <a:chOff x="0" y="0"/>
+          <a:chExt cx="0" cy="0"/>
+        </a:xfrm>
+      </p:grpSpPr>
+      <p:sp>
+        <p:nvSpPr>
+          <p:cNvPr id="5" name="TextBox 4">
+            <a:extLst>
+              <a:ext uri="{FF2B5EF4-FFF2-40B4-BE49-F238E27FC236}">
+                <a16:creationId xmlns:a16="http://schemas.microsoft.com/office/drawing/2014/main" id="{C6E1CBA5-49D2-233A-BE36-49DA35D6A1D8}"/>
+              </a:ext>
+            </a:extLst>
+          </p:cNvPr>
+          <p:cNvSpPr txBox="1"/>
+          <p:nvPr/>
+        </p:nvSpPr>
+        <p:spPr>
+          <a:xfrm>
+            <a:off x="1892808" y="566928"/>
+            <a:ext cx="437940" cy="369332"/>
+          </a:xfrm>
+          <a:prstGeom prst="rect">
+            <a:avLst/>
+          </a:prstGeom>
+          <a:noFill/>
+        </p:spPr>
+        <p:txBody>
+          <a:bodyPr wrap="none" rtlCol="0">
+            <a:spAutoFit/>
+          </a:bodyPr>
+          <a:lstStyle/>
+          <a:p>
+            <a:r>
+              <a:rPr lang="en-US" dirty="0"/>
+              <a:t>q2</a:t>
+            </a:r>
+            <a:endParaRPr lang="en-IL" dirty="0"/>
+          </a:p>
+        </p:txBody>
+      </p:sp>
+      <p:pic>
+        <p:nvPicPr>
+          <p:cNvPr id="7" name="Picture 6" descr="A graph with green squares&#10;&#10;AI-generated content may be incorrect.">
+            <a:extLst>
+              <a:ext uri="{FF2B5EF4-FFF2-40B4-BE49-F238E27FC236}">
+                <a16:creationId xmlns:a16="http://schemas.microsoft.com/office/drawing/2014/main" id="{40E48AD7-CC79-BEC0-3461-16246EFC7C1E}"/>
+              </a:ext>
+            </a:extLst>
+          </p:cNvPr>
+          <p:cNvPicPr>
+            <a:picLocks noChangeAspect="1"/>
+          </p:cNvPicPr>
+          <p:nvPr/>
+        </p:nvPicPr>
+        <p:blipFill>
+          <a:blip r:embed="rId2">
+            <a:extLst>
+              <a:ext uri="{28A0092B-C50C-407E-A947-70E740481C1C}">
+                <a14:useLocalDpi xmlns:a14="http://schemas.microsoft.com/office/drawing/2010/main" val="0"/>
+              </a:ext>
+            </a:extLst>
+          </a:blip>
+          <a:stretch>
+            <a:fillRect/>
+          </a:stretch>
+        </p:blipFill>
+        <p:spPr>
+          <a:xfrm>
+            <a:off x="3169914" y="1234435"/>
+            <a:ext cx="5852172" cy="4389129"/>
+          </a:xfrm>
+          <a:prstGeom prst="rect">
+            <a:avLst/>
+          </a:prstGeom>
+        </p:spPr>
+      </p:pic>
+    </p:spTree>
+    <p:extLst>
+      <p:ext uri="{BB962C8B-B14F-4D97-AF65-F5344CB8AC3E}">
+        <p14:creationId xmlns:p14="http://schemas.microsoft.com/office/powerpoint/2010/main" val="3143842451"/>
+      </p:ext>
+    </p:extLst>
+  </p:cSld>
+  <p:clrMapOvr>
+    <a:masterClrMapping/>
+  </p:clrMapOvr>
+</p:sld>
+</file>
+
+<file path=ppt/slides/slide7.xml><?xml version="1.0" encoding="utf-8"?>
+<p:sld xmlns:a="http://schemas.openxmlformats.org/drawingml/2006/main" xmlns:r="http://schemas.openxmlformats.org/officeDocument/2006/relationships" xmlns:p="http://schemas.openxmlformats.org/presentationml/2006/main">
+  <p:cSld>
+    <p:spTree>
+      <p:nvGrpSpPr>
+        <p:cNvPr id="1" name=""/>
+        <p:cNvGrpSpPr/>
+        <p:nvPr/>
+      </p:nvGrpSpPr>
+      <p:grpSpPr>
+        <a:xfrm>
+          <a:off x="0" y="0"/>
+          <a:ext cx="0" cy="0"/>
+          <a:chOff x="0" y="0"/>
+          <a:chExt cx="0" cy="0"/>
+        </a:xfrm>
+      </p:grpSpPr>
+      <p:pic>
+        <p:nvPicPr>
+          <p:cNvPr id="5" name="Picture 4">
+            <a:extLst>
+              <a:ext uri="{FF2B5EF4-FFF2-40B4-BE49-F238E27FC236}">
+                <a16:creationId xmlns:a16="http://schemas.microsoft.com/office/drawing/2014/main" id="{1A6FA13F-10B2-A6E0-4D48-78AE7EF4726A}"/>
+              </a:ext>
+            </a:extLst>
+          </p:cNvPr>
+          <p:cNvPicPr>
+            <a:picLocks noChangeAspect="1"/>
+          </p:cNvPicPr>
+          <p:nvPr/>
+        </p:nvPicPr>
+        <p:blipFill>
+          <a:blip r:embed="rId2"/>
+          <a:stretch>
+            <a:fillRect/>
+          </a:stretch>
+        </p:blipFill>
+        <p:spPr>
+          <a:xfrm>
+            <a:off x="2286000" y="1047750"/>
+            <a:ext cx="7620000" cy="4762500"/>
+          </a:xfrm>
+          <a:prstGeom prst="rect">
+            <a:avLst/>
+          </a:prstGeom>
+        </p:spPr>
+      </p:pic>
+      <p:sp>
+        <p:nvSpPr>
+          <p:cNvPr id="6" name="TextBox 5">
+            <a:extLst>
+              <a:ext uri="{FF2B5EF4-FFF2-40B4-BE49-F238E27FC236}">
+                <a16:creationId xmlns:a16="http://schemas.microsoft.com/office/drawing/2014/main" id="{DBE279E3-4EFA-DE1C-20CF-2EAB78D73474}"/>
+              </a:ext>
+            </a:extLst>
+          </p:cNvPr>
+          <p:cNvSpPr txBox="1"/>
+          <p:nvPr/>
+        </p:nvSpPr>
+        <p:spPr>
+          <a:xfrm>
+            <a:off x="1892808" y="566928"/>
+            <a:ext cx="437940" cy="369332"/>
+          </a:xfrm>
+          <a:prstGeom prst="rect">
+            <a:avLst/>
+          </a:prstGeom>
+          <a:noFill/>
+        </p:spPr>
+        <p:txBody>
+          <a:bodyPr wrap="none" rtlCol="0">
+            <a:spAutoFit/>
+          </a:bodyPr>
+          <a:lstStyle/>
+          <a:p>
+            <a:r>
+              <a:rPr lang="en-US" dirty="0"/>
+              <a:t>q2</a:t>
+            </a:r>
+            <a:endParaRPr lang="en-IL" dirty="0"/>
+          </a:p>
+        </p:txBody>
+      </p:sp>
+    </p:spTree>
+    <p:extLst>
+      <p:ext uri="{BB962C8B-B14F-4D97-AF65-F5344CB8AC3E}">
+        <p14:creationId xmlns:p14="http://schemas.microsoft.com/office/powerpoint/2010/main" val="2192902738"/>
+      </p:ext>
+    </p:extLst>
+  </p:cSld>
+  <p:clrMapOvr>
+    <a:masterClrMapping/>
+  </p:clrMapOvr>
+</p:sld>
+</file>
+
+<file path=ppt/slides/slide8.xml><?xml version="1.0" encoding="utf-8"?>
+<p:sld xmlns:a="http://schemas.openxmlformats.org/drawingml/2006/main" xmlns:r="http://schemas.openxmlformats.org/officeDocument/2006/relationships" xmlns:p="http://schemas.openxmlformats.org/presentationml/2006/main">
+  <p:cSld>
+    <p:spTree>
+      <p:nvGrpSpPr>
+        <p:cNvPr id="1" name=""/>
+        <p:cNvGrpSpPr/>
+        <p:nvPr/>
+      </p:nvGrpSpPr>
+      <p:grpSpPr>
+        <a:xfrm>
+          <a:off x="0" y="0"/>
+          <a:ext cx="0" cy="0"/>
+          <a:chOff x="0" y="0"/>
+          <a:chExt cx="0" cy="0"/>
+        </a:xfrm>
+      </p:grpSpPr>
+      <p:pic>
+        <p:nvPicPr>
+          <p:cNvPr id="5" name="Picture 4">
+            <a:extLst>
+              <a:ext uri="{FF2B5EF4-FFF2-40B4-BE49-F238E27FC236}">
+                <a16:creationId xmlns:a16="http://schemas.microsoft.com/office/drawing/2014/main" id="{A31A28AE-9097-3C7A-1BB3-C2454160DF85}"/>
+              </a:ext>
+            </a:extLst>
+          </p:cNvPr>
+          <p:cNvPicPr>
+            <a:picLocks noChangeAspect="1"/>
+          </p:cNvPicPr>
+          <p:nvPr/>
+        </p:nvPicPr>
+        <p:blipFill>
+          <a:blip r:embed="rId2"/>
+          <a:stretch>
+            <a:fillRect/>
+          </a:stretch>
+        </p:blipFill>
+        <p:spPr>
+          <a:xfrm>
+            <a:off x="2286000" y="1524000"/>
+            <a:ext cx="7620000" cy="3810000"/>
+          </a:xfrm>
+          <a:prstGeom prst="rect">
+            <a:avLst/>
+          </a:prstGeom>
+        </p:spPr>
+      </p:pic>
+      <p:sp>
+        <p:nvSpPr>
+          <p:cNvPr id="6" name="TextBox 5">
+            <a:extLst>
+              <a:ext uri="{FF2B5EF4-FFF2-40B4-BE49-F238E27FC236}">
+                <a16:creationId xmlns:a16="http://schemas.microsoft.com/office/drawing/2014/main" id="{830FC197-008C-2BE1-C576-499604F1EBE3}"/>
+              </a:ext>
+            </a:extLst>
+          </p:cNvPr>
+          <p:cNvSpPr txBox="1"/>
+          <p:nvPr/>
+        </p:nvSpPr>
+        <p:spPr>
+          <a:xfrm>
+            <a:off x="1892808" y="566928"/>
+            <a:ext cx="437940" cy="369332"/>
+          </a:xfrm>
+          <a:prstGeom prst="rect">
+            <a:avLst/>
+          </a:prstGeom>
+          <a:noFill/>
+        </p:spPr>
+        <p:txBody>
+          <a:bodyPr wrap="none" rtlCol="0">
+            <a:spAutoFit/>
+          </a:bodyPr>
+          <a:lstStyle/>
+          <a:p>
+            <a:r>
+              <a:rPr lang="en-US" dirty="0"/>
+              <a:t>q2</a:t>
+            </a:r>
+            <a:endParaRPr lang="en-IL" dirty="0"/>
+          </a:p>
+        </p:txBody>
+      </p:sp>
+    </p:spTree>
+    <p:extLst>
+      <p:ext uri="{BB962C8B-B14F-4D97-AF65-F5344CB8AC3E}">
+        <p14:creationId xmlns:p14="http://schemas.microsoft.com/office/powerpoint/2010/main" val="2671251749"/>
+      </p:ext>
+    </p:extLst>
+  </p:cSld>
+  <p:clrMapOvr>
+    <a:masterClrMapping/>
+  </p:clrMapOvr>
+</p:sld>
+</file>
+
+<file path=ppt/slides/slide9.xml><?xml version="1.0" encoding="utf-8"?>
+<p:sld xmlns:a="http://schemas.openxmlformats.org/drawingml/2006/main" xmlns:r="http://schemas.openxmlformats.org/officeDocument/2006/relationships" xmlns:p="http://schemas.openxmlformats.org/presentationml/2006/main">
+  <p:cSld>
+    <p:spTree>
+      <p:nvGrpSpPr>
+        <p:cNvPr id="1" name=""/>
+        <p:cNvGrpSpPr/>
+        <p:nvPr/>
+      </p:nvGrpSpPr>
+      <p:grpSpPr>
+        <a:xfrm>
+          <a:off x="0" y="0"/>
+          <a:ext cx="0" cy="0"/>
+          <a:chOff x="0" y="0"/>
+          <a:chExt cx="0" cy="0"/>
+        </a:xfrm>
+      </p:grpSpPr>
+      <p:sp>
+        <p:nvSpPr>
+          <p:cNvPr id="4" name="TextBox 3">
+            <a:extLst>
+              <a:ext uri="{FF2B5EF4-FFF2-40B4-BE49-F238E27FC236}">
+                <a16:creationId xmlns:a16="http://schemas.microsoft.com/office/drawing/2014/main" id="{C1398661-1654-0166-B5B9-09A829BBF066}"/>
+              </a:ext>
+            </a:extLst>
+          </p:cNvPr>
+          <p:cNvSpPr txBox="1"/>
+          <p:nvPr/>
+        </p:nvSpPr>
+        <p:spPr>
+          <a:xfrm>
+            <a:off x="1892808" y="566928"/>
+            <a:ext cx="437940" cy="369332"/>
+          </a:xfrm>
+          <a:prstGeom prst="rect">
+            <a:avLst/>
+          </a:prstGeom>
+          <a:noFill/>
+        </p:spPr>
+        <p:txBody>
+          <a:bodyPr wrap="none" rtlCol="0">
+            <a:spAutoFit/>
+          </a:bodyPr>
+          <a:lstStyle/>
+          <a:p>
+            <a:r>
+              <a:rPr lang="en-US" dirty="0"/>
+              <a:t>q2</a:t>
+            </a:r>
+            <a:endParaRPr lang="en-IL" dirty="0"/>
+          </a:p>
+        </p:txBody>
+      </p:sp>
+      <p:pic>
+        <p:nvPicPr>
+          <p:cNvPr id="6" name="Picture 5">
+            <a:extLst>
+              <a:ext uri="{FF2B5EF4-FFF2-40B4-BE49-F238E27FC236}">
+                <a16:creationId xmlns:a16="http://schemas.microsoft.com/office/drawing/2014/main" id="{BCDD23CE-66BD-7FB2-6E11-FF968A2195F9}"/>
+              </a:ext>
+            </a:extLst>
+          </p:cNvPr>
+          <p:cNvPicPr>
+            <a:picLocks noChangeAspect="1"/>
+          </p:cNvPicPr>
+          <p:nvPr/>
+        </p:nvPicPr>
+        <p:blipFill>
+          <a:blip r:embed="rId2"/>
+          <a:stretch>
+            <a:fillRect/>
+          </a:stretch>
+        </p:blipFill>
+        <p:spPr>
+          <a:xfrm>
+            <a:off x="2286000" y="1524000"/>
+            <a:ext cx="7620000" cy="3810000"/>
+          </a:xfrm>
+          <a:prstGeom prst="rect">
+            <a:avLst/>
+          </a:prstGeom>
+        </p:spPr>
+      </p:pic>
+    </p:spTree>
+    <p:extLst>
+      <p:ext uri="{BB962C8B-B14F-4D97-AF65-F5344CB8AC3E}">
+        <p14:creationId xmlns:p14="http://schemas.microsoft.com/office/powerpoint/2010/main" val="3143617862"/>
       </p:ext>
     </p:extLst>
   </p:cSld>

</xml_diff>